<commit_message>
did the problems part
</commit_message>
<xml_diff>
--- a/dtc_team16_pitch_presentation.pptx
+++ b/dtc_team16_pitch_presentation.pptx
@@ -6,10 +6,15 @@
   </p:sldMasterIdLst>
   <p:sldIdLst>
     <p:sldId id="256" r:id="rId2"/>
-    <p:sldId id="257" r:id="rId3"/>
-    <p:sldId id="258" r:id="rId4"/>
-    <p:sldId id="259" r:id="rId5"/>
-    <p:sldId id="260" r:id="rId6"/>
+    <p:sldId id="266" r:id="rId3"/>
+    <p:sldId id="263" r:id="rId4"/>
+    <p:sldId id="257" r:id="rId5"/>
+    <p:sldId id="262" r:id="rId6"/>
+    <p:sldId id="264" r:id="rId7"/>
+    <p:sldId id="265" r:id="rId8"/>
+    <p:sldId id="258" r:id="rId9"/>
+    <p:sldId id="259" r:id="rId10"/>
+    <p:sldId id="260" r:id="rId11"/>
   </p:sldIdLst>
   <p:sldSz cx="12192000" cy="6858000"/>
   <p:notesSz cx="6858000" cy="9144000"/>
@@ -294,7 +299,7 @@
           <a:p>
             <a:fld id="{48A87A34-81AB-432B-8DAE-1953F412C126}" type="datetimeFigureOut">
               <a:rPr lang="en-US" dirty="0"/>
-              <a:t>10/2/2018</a:t>
+              <a:t>10/3/2018</a:t>
             </a:fld>
             <a:endParaRPr lang="en-US" dirty="0"/>
           </a:p>
@@ -556,7 +561,7 @@
           <a:p>
             <a:fld id="{48A87A34-81AB-432B-8DAE-1953F412C126}" type="datetimeFigureOut">
               <a:rPr lang="en-US" dirty="0"/>
-              <a:t>10/2/2018</a:t>
+              <a:t>10/3/2018</a:t>
             </a:fld>
             <a:endParaRPr lang="en-US" dirty="0"/>
           </a:p>
@@ -783,7 +788,7 @@
             <a:fld id="{48A87A34-81AB-432B-8DAE-1953F412C126}" type="datetimeFigureOut">
               <a:rPr lang="en-US" dirty="0"/>
               <a:pPr/>
-              <a:t>10/2/2018</a:t>
+              <a:t>10/3/2018</a:t>
             </a:fld>
             <a:endParaRPr lang="en-US" dirty="0"/>
           </a:p>
@@ -1089,7 +1094,7 @@
             <a:fld id="{48A87A34-81AB-432B-8DAE-1953F412C126}" type="datetimeFigureOut">
               <a:rPr lang="en-US" dirty="0"/>
               <a:pPr/>
-              <a:t>10/2/2018</a:t>
+              <a:t>10/3/2018</a:t>
             </a:fld>
             <a:endParaRPr lang="en-US" dirty="0"/>
           </a:p>
@@ -1558,7 +1563,7 @@
             <a:fld id="{48A87A34-81AB-432B-8DAE-1953F412C126}" type="datetimeFigureOut">
               <a:rPr lang="en-US" dirty="0"/>
               <a:pPr/>
-              <a:t>10/2/2018</a:t>
+              <a:t>10/3/2018</a:t>
             </a:fld>
             <a:endParaRPr lang="en-US" dirty="0"/>
           </a:p>
@@ -2100,7 +2105,7 @@
           <a:p>
             <a:fld id="{48A87A34-81AB-432B-8DAE-1953F412C126}" type="datetimeFigureOut">
               <a:rPr lang="en-US" dirty="0"/>
-              <a:t>10/2/2018</a:t>
+              <a:t>10/3/2018</a:t>
             </a:fld>
             <a:endParaRPr lang="en-US" dirty="0"/>
           </a:p>
@@ -2869,7 +2874,7 @@
           <a:p>
             <a:fld id="{48A87A34-81AB-432B-8DAE-1953F412C126}" type="datetimeFigureOut">
               <a:rPr lang="en-US" dirty="0"/>
-              <a:t>10/2/2018</a:t>
+              <a:t>10/3/2018</a:t>
             </a:fld>
             <a:endParaRPr lang="en-US" dirty="0"/>
           </a:p>
@@ -3039,7 +3044,7 @@
           <a:p>
             <a:fld id="{48A87A34-81AB-432B-8DAE-1953F412C126}" type="datetimeFigureOut">
               <a:rPr lang="en-US" dirty="0"/>
-              <a:t>10/2/2018</a:t>
+              <a:t>10/3/2018</a:t>
             </a:fld>
             <a:endParaRPr lang="en-US" dirty="0"/>
           </a:p>
@@ -3258,7 +3263,7 @@
             <a:fld id="{48A87A34-81AB-432B-8DAE-1953F412C126}" type="datetimeFigureOut">
               <a:rPr lang="en-US" dirty="0"/>
               <a:pPr/>
-              <a:t>10/2/2018</a:t>
+              <a:t>10/3/2018</a:t>
             </a:fld>
             <a:endParaRPr lang="en-US" dirty="0"/>
           </a:p>
@@ -3433,7 +3438,7 @@
           <a:p>
             <a:fld id="{48A87A34-81AB-432B-8DAE-1953F412C126}" type="datetimeFigureOut">
               <a:rPr lang="en-US" dirty="0"/>
-              <a:t>10/2/2018</a:t>
+              <a:t>10/3/2018</a:t>
             </a:fld>
             <a:endParaRPr lang="en-US" dirty="0"/>
           </a:p>
@@ -3718,7 +3723,7 @@
             <a:fld id="{48A87A34-81AB-432B-8DAE-1953F412C126}" type="datetimeFigureOut">
               <a:rPr lang="en-US" dirty="0"/>
               <a:pPr/>
-              <a:t>10/2/2018</a:t>
+              <a:t>10/3/2018</a:t>
             </a:fld>
             <a:endParaRPr lang="en-US" dirty="0"/>
           </a:p>
@@ -3955,7 +3960,7 @@
           <a:p>
             <a:fld id="{48A87A34-81AB-432B-8DAE-1953F412C126}" type="datetimeFigureOut">
               <a:rPr lang="en-US" dirty="0"/>
-              <a:t>10/2/2018</a:t>
+              <a:t>10/3/2018</a:t>
             </a:fld>
             <a:endParaRPr lang="en-US" dirty="0"/>
           </a:p>
@@ -4329,7 +4334,7 @@
           <a:p>
             <a:fld id="{48A87A34-81AB-432B-8DAE-1953F412C126}" type="datetimeFigureOut">
               <a:rPr lang="en-US" dirty="0"/>
-              <a:t>10/2/2018</a:t>
+              <a:t>10/3/2018</a:t>
             </a:fld>
             <a:endParaRPr lang="en-US" dirty="0"/>
           </a:p>
@@ -4442,7 +4447,7 @@
           <a:p>
             <a:fld id="{48A87A34-81AB-432B-8DAE-1953F412C126}" type="datetimeFigureOut">
               <a:rPr lang="en-US" dirty="0"/>
-              <a:t>10/2/2018</a:t>
+              <a:t>10/3/2018</a:t>
             </a:fld>
             <a:endParaRPr lang="en-US" dirty="0"/>
           </a:p>
@@ -4532,7 +4537,7 @@
           <a:p>
             <a:fld id="{48A87A34-81AB-432B-8DAE-1953F412C126}" type="datetimeFigureOut">
               <a:rPr lang="en-US" dirty="0"/>
-              <a:t>10/2/2018</a:t>
+              <a:t>10/3/2018</a:t>
             </a:fld>
             <a:endParaRPr lang="en-US" dirty="0"/>
           </a:p>
@@ -4776,7 +4781,7 @@
           <a:p>
             <a:fld id="{48A87A34-81AB-432B-8DAE-1953F412C126}" type="datetimeFigureOut">
               <a:rPr lang="en-US" dirty="0"/>
-              <a:t>10/2/2018</a:t>
+              <a:t>10/3/2018</a:t>
             </a:fld>
             <a:endParaRPr lang="en-US" dirty="0"/>
           </a:p>
@@ -5028,7 +5033,7 @@
           <a:p>
             <a:fld id="{48A87A34-81AB-432B-8DAE-1953F412C126}" type="datetimeFigureOut">
               <a:rPr lang="en-US" dirty="0"/>
-              <a:t>10/2/2018</a:t>
+              <a:t>10/3/2018</a:t>
             </a:fld>
             <a:endParaRPr lang="en-US" dirty="0"/>
           </a:p>
@@ -5267,7 +5272,7 @@
             <a:fld id="{48A87A34-81AB-432B-8DAE-1953F412C126}" type="datetimeFigureOut">
               <a:rPr lang="en-US" dirty="0"/>
               <a:pPr/>
-              <a:t>10/2/2018</a:t>
+              <a:t>10/3/2018</a:t>
             </a:fld>
             <a:endParaRPr lang="en-US" dirty="0"/>
           </a:p>
@@ -5740,7 +5745,7 @@
 </p:sld>
 </file>
 
-<file path=ppt/slides/slide2.xml><?xml version="1.0" encoding="utf-8"?>
+<file path=ppt/slides/slide10.xml><?xml version="1.0" encoding="utf-8"?>
 <p:sld xmlns:a="http://schemas.openxmlformats.org/drawingml/2006/main" xmlns:r="http://schemas.openxmlformats.org/officeDocument/2006/relationships" xmlns:p="http://schemas.openxmlformats.org/presentationml/2006/main">
   <p:cSld>
     <p:spTree>
@@ -5762,6 +5767,220 @@
           <p:cNvPr id="2" name="Title 1">
             <a:extLst>
               <a:ext uri="{FF2B5EF4-FFF2-40B4-BE49-F238E27FC236}">
+                <a16:creationId xmlns:a16="http://schemas.microsoft.com/office/drawing/2014/main" id="{60FBE992-B63A-4C88-B8A4-BFA1087398DD}"/>
+              </a:ext>
+            </a:extLst>
+          </p:cNvPr>
+          <p:cNvSpPr>
+            <a:spLocks noGrp="1"/>
+          </p:cNvSpPr>
+          <p:nvPr>
+            <p:ph type="title"/>
+          </p:nvPr>
+        </p:nvSpPr>
+        <p:spPr/>
+        <p:txBody>
+          <a:bodyPr/>
+          <a:lstStyle/>
+          <a:p>
+            <a:r>
+              <a:rPr lang="en-CA" dirty="0"/>
+              <a:t>Solution 1</a:t>
+            </a:r>
+          </a:p>
+        </p:txBody>
+      </p:sp>
+      <p:sp>
+        <p:nvSpPr>
+          <p:cNvPr id="3" name="Content Placeholder 2">
+            <a:extLst>
+              <a:ext uri="{FF2B5EF4-FFF2-40B4-BE49-F238E27FC236}">
+                <a16:creationId xmlns:a16="http://schemas.microsoft.com/office/drawing/2014/main" id="{F44E741A-FE57-4D53-865D-34CC64A6F4D1}"/>
+              </a:ext>
+            </a:extLst>
+          </p:cNvPr>
+          <p:cNvSpPr>
+            <a:spLocks noGrp="1"/>
+          </p:cNvSpPr>
+          <p:nvPr>
+            <p:ph idx="1"/>
+          </p:nvPr>
+        </p:nvSpPr>
+        <p:spPr/>
+        <p:txBody>
+          <a:bodyPr/>
+          <a:lstStyle/>
+          <a:p>
+            <a:r>
+              <a:rPr lang="en-CA" dirty="0"/>
+              <a:t>Provide a legal resource for player-managers that will contain:</a:t>
+            </a:r>
+          </a:p>
+          <a:p>
+            <a:r>
+              <a:rPr lang="en-CA" dirty="0"/>
+              <a:t>-legal documentation</a:t>
+            </a:r>
+          </a:p>
+          <a:p>
+            <a:r>
+              <a:rPr lang="en-CA" dirty="0"/>
+              <a:t>-labor law documentation.</a:t>
+            </a:r>
+          </a:p>
+          <a:p>
+            <a:r>
+              <a:rPr lang="en-CA" dirty="0"/>
+              <a:t>-Attorney contact.</a:t>
+            </a:r>
+          </a:p>
+          <a:p>
+            <a:r>
+              <a:rPr lang="en-CA" dirty="0"/>
+              <a:t>-contract aide.</a:t>
+            </a:r>
+          </a:p>
+          <a:p>
+            <a:pPr marL="0" indent="0">
+              <a:buNone/>
+            </a:pPr>
+            <a:endParaRPr lang="en-CA" dirty="0"/>
+          </a:p>
+        </p:txBody>
+      </p:sp>
+    </p:spTree>
+    <p:extLst>
+      <p:ext uri="{BB962C8B-B14F-4D97-AF65-F5344CB8AC3E}">
+        <p14:creationId xmlns:p14="http://schemas.microsoft.com/office/powerpoint/2010/main" val="882208448"/>
+      </p:ext>
+    </p:extLst>
+  </p:cSld>
+  <p:clrMapOvr>
+    <a:masterClrMapping/>
+  </p:clrMapOvr>
+</p:sld>
+</file>
+
+<file path=ppt/slides/slide2.xml><?xml version="1.0" encoding="utf-8"?>
+<p:sld xmlns:a="http://schemas.openxmlformats.org/drawingml/2006/main" xmlns:r="http://schemas.openxmlformats.org/officeDocument/2006/relationships" xmlns:p="http://schemas.openxmlformats.org/presentationml/2006/main">
+  <p:cSld>
+    <p:bg>
+      <p:bgPr>
+        <a:solidFill>
+          <a:schemeClr val="bg1"/>
+        </a:solidFill>
+        <a:effectLst/>
+      </p:bgPr>
+    </p:bg>
+    <p:spTree>
+      <p:nvGrpSpPr>
+        <p:cNvPr id="1" name=""/>
+        <p:cNvGrpSpPr/>
+        <p:nvPr/>
+      </p:nvGrpSpPr>
+      <p:grpSpPr>
+        <a:xfrm>
+          <a:off x="0" y="0"/>
+          <a:ext cx="0" cy="0"/>
+          <a:chOff x="0" y="0"/>
+          <a:chExt cx="0" cy="0"/>
+        </a:xfrm>
+      </p:grpSpPr>
+      <p:pic>
+        <p:nvPicPr>
+          <p:cNvPr id="17" name="Picture 11">
+            <a:extLst>
+              <a:ext uri="{FF2B5EF4-FFF2-40B4-BE49-F238E27FC236}">
+                <a16:creationId xmlns:a16="http://schemas.microsoft.com/office/drawing/2014/main" id="{CFD580F5-E7BF-4C1D-BEFD-4A4601EBA876}"/>
+              </a:ext>
+              <a:ext uri="{C183D7F6-B498-43B3-948B-1728B52AA6E4}">
+                <adec:decorative xmlns:adec="http://schemas.microsoft.com/office/drawing/2017/decorative" val="1"/>
+              </a:ext>
+            </a:extLst>
+          </p:cNvPr>
+          <p:cNvPicPr>
+            <a:picLocks noGrp="1" noRot="1" noChangeAspect="1" noMove="1" noResize="1" noEditPoints="1" noAdjustHandles="1" noChangeArrowheads="1" noChangeShapeType="1" noCrop="1"/>
+          </p:cNvPicPr>
+          <p:nvPr>
+            <p:extLst>
+              <p:ext uri="{386F3935-93C4-4BCD-93E2-E3B085C9AB24}">
+                <p16:designElem xmlns:p16="http://schemas.microsoft.com/office/powerpoint/2015/main" val="1"/>
+              </p:ext>
+            </p:extLst>
+          </p:nvPr>
+        </p:nvPicPr>
+        <p:blipFill>
+          <a:blip r:embed="rId2">
+            <a:extLst>
+              <a:ext uri="{28A0092B-C50C-407E-A947-70E740481C1C}">
+                <a14:useLocalDpi xmlns:a14="http://schemas.microsoft.com/office/drawing/2010/main" val="0"/>
+              </a:ext>
+            </a:extLst>
+          </a:blip>
+          <a:stretch>
+            <a:fillRect/>
+          </a:stretch>
+        </p:blipFill>
+        <p:spPr>
+          <a:xfrm>
+            <a:off x="0" y="0"/>
+            <a:ext cx="12192000" cy="1441450"/>
+          </a:xfrm>
+          <a:prstGeom prst="rect">
+            <a:avLst/>
+          </a:prstGeom>
+        </p:spPr>
+      </p:pic>
+      <p:pic>
+        <p:nvPicPr>
+          <p:cNvPr id="19" name="Picture 13">
+            <a:extLst>
+              <a:ext uri="{FF2B5EF4-FFF2-40B4-BE49-F238E27FC236}">
+                <a16:creationId xmlns:a16="http://schemas.microsoft.com/office/drawing/2014/main" id="{F0F06750-78FE-4472-8DA5-14CF3336F811}"/>
+              </a:ext>
+              <a:ext uri="{C183D7F6-B498-43B3-948B-1728B52AA6E4}">
+                <adec:decorative xmlns:adec="http://schemas.microsoft.com/office/drawing/2017/decorative" val="1"/>
+              </a:ext>
+            </a:extLst>
+          </p:cNvPr>
+          <p:cNvPicPr>
+            <a:picLocks noGrp="1" noRot="1" noChangeAspect="1" noMove="1" noResize="1" noEditPoints="1" noAdjustHandles="1" noChangeArrowheads="1" noChangeShapeType="1" noCrop="1"/>
+          </p:cNvPicPr>
+          <p:nvPr>
+            <p:extLst>
+              <p:ext uri="{386F3935-93C4-4BCD-93E2-E3B085C9AB24}">
+                <p16:designElem xmlns:p16="http://schemas.microsoft.com/office/powerpoint/2015/main" val="1"/>
+              </p:ext>
+            </p:extLst>
+          </p:nvPr>
+        </p:nvPicPr>
+        <p:blipFill>
+          <a:blip r:embed="rId3">
+            <a:extLst>
+              <a:ext uri="{28A0092B-C50C-407E-A947-70E740481C1C}">
+                <a14:useLocalDpi xmlns:a14="http://schemas.microsoft.com/office/drawing/2010/main" val="0"/>
+              </a:ext>
+            </a:extLst>
+          </a:blip>
+          <a:stretch>
+            <a:fillRect/>
+          </a:stretch>
+        </p:blipFill>
+        <p:spPr>
+          <a:xfrm>
+            <a:off x="0" y="4375150"/>
+            <a:ext cx="12192000" cy="2482850"/>
+          </a:xfrm>
+          <a:prstGeom prst="rect">
+            <a:avLst/>
+          </a:prstGeom>
+        </p:spPr>
+      </p:pic>
+      <p:sp>
+        <p:nvSpPr>
+          <p:cNvPr id="2" name="Title 1">
+            <a:extLst>
+              <a:ext uri="{FF2B5EF4-FFF2-40B4-BE49-F238E27FC236}">
                 <a16:creationId xmlns:a16="http://schemas.microsoft.com/office/drawing/2014/main" id="{A384375E-3C8C-43AC-AB18-7E7FB941AE65}"/>
               </a:ext>
             </a:extLst>
@@ -5773,68 +5992,189 @@
             <p:ph type="title"/>
           </p:nvPr>
         </p:nvSpPr>
-        <p:spPr/>
-        <p:txBody>
-          <a:bodyPr/>
-          <a:lstStyle/>
-          <a:p>
-            <a:r>
-              <a:rPr lang="en-CA" dirty="0"/>
-              <a:t>Problem</a:t>
-            </a:r>
-          </a:p>
-        </p:txBody>
-      </p:sp>
-      <p:sp>
-        <p:nvSpPr>
-          <p:cNvPr id="3" name="Content Placeholder 2">
+        <p:spPr>
+          <a:xfrm>
+            <a:off x="8536277" y="673240"/>
+            <a:ext cx="3031524" cy="3446373"/>
+          </a:xfrm>
+          <a:noFill/>
+          <a:ln w="19050">
+            <a:noFill/>
+            <a:prstDash val="dash"/>
+          </a:ln>
+        </p:spPr>
+        <p:txBody>
+          <a:bodyPr vert="horz" lIns="91440" tIns="45720" rIns="91440" bIns="45720" rtlCol="0" anchor="b">
+            <a:normAutofit/>
+          </a:bodyPr>
+          <a:lstStyle/>
+          <a:p>
+            <a:r>
+              <a:rPr lang="en-US" sz="4400"/>
+              <a:t>Problem-rapid growth</a:t>
+            </a:r>
+          </a:p>
+        </p:txBody>
+      </p:sp>
+      <p:pic>
+        <p:nvPicPr>
+          <p:cNvPr id="7" name="Picture 6">
             <a:extLst>
               <a:ext uri="{FF2B5EF4-FFF2-40B4-BE49-F238E27FC236}">
-                <a16:creationId xmlns:a16="http://schemas.microsoft.com/office/drawing/2014/main" id="{DD82222C-BF2E-4E1E-B6C7-1D000FB0B799}"/>
+                <a16:creationId xmlns:a16="http://schemas.microsoft.com/office/drawing/2014/main" id="{F04765AA-62BC-4774-9DC0-C9C734AE9230}"/>
               </a:ext>
             </a:extLst>
           </p:cNvPr>
-          <p:cNvSpPr>
-            <a:spLocks noGrp="1"/>
-          </p:cNvSpPr>
-          <p:nvPr>
-            <p:ph idx="1"/>
-          </p:nvPr>
-        </p:nvSpPr>
-        <p:spPr/>
-        <p:txBody>
-          <a:bodyPr/>
-          <a:lstStyle/>
-          <a:p>
-            <a:r>
-              <a:rPr lang="en-CA" dirty="0"/>
-              <a:t>E-sports is new</a:t>
-            </a:r>
-          </a:p>
-          <a:p>
-            <a:r>
-              <a:rPr lang="en-CA" dirty="0"/>
-              <a:t>People that want to get into e-sports have little to zero experience with the business industry, and many aspiring individuals can be taken advantage of.</a:t>
-            </a:r>
-          </a:p>
-          <a:p>
-            <a:r>
-              <a:rPr lang="en-CA" dirty="0"/>
-              <a:t>Mainly, young adults/youth who have very little life experience, and a lot of big business people are in their to take advantage of them.</a:t>
-            </a:r>
-          </a:p>
-          <a:p>
-            <a:pPr marL="0" indent="0">
-              <a:buNone/>
-            </a:pPr>
-            <a:endParaRPr lang="en-CA" dirty="0"/>
+          <p:cNvPicPr>
+            <a:picLocks noChangeAspect="1"/>
+          </p:cNvPicPr>
+          <p:nvPr/>
+        </p:nvPicPr>
+        <p:blipFill rotWithShape="1">
+          <a:blip r:embed="rId4"/>
+          <a:srcRect r="14761"/>
+          <a:stretch/>
+        </p:blipFill>
+        <p:spPr>
+          <a:xfrm>
+            <a:off x="2405" y="10"/>
+            <a:ext cx="7794245" cy="6857990"/>
+          </a:xfrm>
+          <a:prstGeom prst="rect">
+            <a:avLst/>
+          </a:prstGeom>
+        </p:spPr>
+      </p:pic>
+      <p:sp>
+        <p:nvSpPr>
+          <p:cNvPr id="16" name="Rectangle 15">
+            <a:extLst>
+              <a:ext uri="{FF2B5EF4-FFF2-40B4-BE49-F238E27FC236}">
+                <a16:creationId xmlns:a16="http://schemas.microsoft.com/office/drawing/2014/main" id="{2DFFD9D3-0E77-42C3-B89D-A987E7760A5E}"/>
+              </a:ext>
+              <a:ext uri="{C183D7F6-B498-43B3-948B-1728B52AA6E4}">
+                <adec:decorative xmlns:adec="http://schemas.microsoft.com/office/drawing/2017/decorative" val="1"/>
+              </a:ext>
+            </a:extLst>
+          </p:cNvPr>
+          <p:cNvSpPr>
+            <a:spLocks noGrp="1" noRot="1" noChangeAspect="1" noMove="1" noResize="1" noEditPoints="1" noAdjustHandles="1" noChangeArrowheads="1" noChangeShapeType="1" noTextEdit="1"/>
+          </p:cNvSpPr>
+          <p:nvPr>
+            <p:extLst>
+              <p:ext uri="{386F3935-93C4-4BCD-93E2-E3B085C9AB24}">
+                <p16:designElem xmlns:p16="http://schemas.microsoft.com/office/powerpoint/2015/main" val="1"/>
+              </p:ext>
+            </p:extLst>
+          </p:nvPr>
+        </p:nvSpPr>
+        <p:spPr>
+          <a:xfrm>
+            <a:off x="7946782" y="-1"/>
+            <a:ext cx="4245218" cy="536715"/>
+          </a:xfrm>
+          <a:prstGeom prst="rect">
+            <a:avLst/>
+          </a:prstGeom>
+          <a:solidFill>
+            <a:schemeClr val="bg1"/>
+          </a:solidFill>
+          <a:ln>
+            <a:noFill/>
+          </a:ln>
+        </p:spPr>
+        <p:style>
+          <a:lnRef idx="2">
+            <a:schemeClr val="accent1">
+              <a:shade val="50000"/>
+            </a:schemeClr>
+          </a:lnRef>
+          <a:fillRef idx="1">
+            <a:schemeClr val="accent1"/>
+          </a:fillRef>
+          <a:effectRef idx="0">
+            <a:schemeClr val="accent1"/>
+          </a:effectRef>
+          <a:fontRef idx="minor">
+            <a:schemeClr val="lt1"/>
+          </a:fontRef>
+        </p:style>
+        <p:txBody>
+          <a:bodyPr rtlCol="0" anchor="ctr"/>
+          <a:lstStyle/>
+          <a:p>
+            <a:pPr algn="ctr"/>
+            <a:endParaRPr lang="en-US"/>
+          </a:p>
+        </p:txBody>
+      </p:sp>
+      <p:sp>
+        <p:nvSpPr>
+          <p:cNvPr id="18" name="Rectangle 17">
+            <a:extLst>
+              <a:ext uri="{FF2B5EF4-FFF2-40B4-BE49-F238E27FC236}">
+                <a16:creationId xmlns:a16="http://schemas.microsoft.com/office/drawing/2014/main" id="{3C48F185-A6F4-40C2-A466-5CB3F23F2F48}"/>
+              </a:ext>
+              <a:ext uri="{C183D7F6-B498-43B3-948B-1728B52AA6E4}">
+                <adec:decorative xmlns:adec="http://schemas.microsoft.com/office/drawing/2017/decorative" val="1"/>
+              </a:ext>
+            </a:extLst>
+          </p:cNvPr>
+          <p:cNvSpPr>
+            <a:spLocks noGrp="1" noRot="1" noChangeAspect="1" noMove="1" noResize="1" noEditPoints="1" noAdjustHandles="1" noChangeArrowheads="1" noChangeShapeType="1" noTextEdit="1"/>
+          </p:cNvSpPr>
+          <p:nvPr>
+            <p:extLst>
+              <p:ext uri="{386F3935-93C4-4BCD-93E2-E3B085C9AB24}">
+                <p16:designElem xmlns:p16="http://schemas.microsoft.com/office/powerpoint/2015/main" val="1"/>
+              </p:ext>
+            </p:extLst>
+          </p:nvPr>
+        </p:nvSpPr>
+        <p:spPr>
+          <a:xfrm>
+            <a:off x="7796651" y="0"/>
+            <a:ext cx="164592" cy="6858000"/>
+          </a:xfrm>
+          <a:prstGeom prst="rect">
+            <a:avLst/>
+          </a:prstGeom>
+          <a:solidFill>
+            <a:schemeClr val="bg1"/>
+          </a:solidFill>
+          <a:ln>
+            <a:noFill/>
+          </a:ln>
+        </p:spPr>
+        <p:style>
+          <a:lnRef idx="2">
+            <a:schemeClr val="accent1">
+              <a:shade val="50000"/>
+            </a:schemeClr>
+          </a:lnRef>
+          <a:fillRef idx="1">
+            <a:schemeClr val="accent1"/>
+          </a:fillRef>
+          <a:effectRef idx="0">
+            <a:schemeClr val="accent1"/>
+          </a:effectRef>
+          <a:fontRef idx="minor">
+            <a:schemeClr val="lt1"/>
+          </a:fontRef>
+        </p:style>
+        <p:txBody>
+          <a:bodyPr rtlCol="0" anchor="ctr"/>
+          <a:lstStyle/>
+          <a:p>
+            <a:pPr algn="ctr"/>
+            <a:endParaRPr lang="en-US"/>
           </a:p>
         </p:txBody>
       </p:sp>
     </p:spTree>
     <p:extLst>
       <p:ext uri="{BB962C8B-B14F-4D97-AF65-F5344CB8AC3E}">
-        <p14:creationId xmlns:p14="http://schemas.microsoft.com/office/powerpoint/2010/main" val="361759928"/>
+        <p14:creationId xmlns:p14="http://schemas.microsoft.com/office/powerpoint/2010/main" val="1101432828"/>
       </p:ext>
     </p:extLst>
   </p:cSld>
@@ -5869,86 +6209,12 @@
           <a:chExt cx="0" cy="0"/>
         </a:xfrm>
       </p:grpSpPr>
-      <p:sp>
-        <p:nvSpPr>
-          <p:cNvPr id="2" name="Title 1">
+      <p:sp useBgFill="1">
+        <p:nvSpPr>
+          <p:cNvPr id="23" name="Rectangle 18">
             <a:extLst>
               <a:ext uri="{FF2B5EF4-FFF2-40B4-BE49-F238E27FC236}">
-                <a16:creationId xmlns:a16="http://schemas.microsoft.com/office/drawing/2014/main" id="{C0012968-7C8C-4CDD-97B6-902A7555D4E0}"/>
-              </a:ext>
-            </a:extLst>
-          </p:cNvPr>
-          <p:cNvSpPr>
-            <a:spLocks noGrp="1"/>
-          </p:cNvSpPr>
-          <p:nvPr>
-            <p:ph type="title"/>
-          </p:nvPr>
-        </p:nvSpPr>
-        <p:spPr>
-          <a:xfrm>
-            <a:off x="685799" y="764373"/>
-            <a:ext cx="3977639" cy="1600200"/>
-          </a:xfrm>
-        </p:spPr>
-        <p:txBody>
-          <a:bodyPr anchor="b">
-            <a:normAutofit/>
-          </a:bodyPr>
-          <a:lstStyle/>
-          <a:p>
-            <a:pPr algn="l"/>
-            <a:r>
-              <a:rPr lang="en-CA" sz="3200"/>
-              <a:t>Target</a:t>
-            </a:r>
-          </a:p>
-        </p:txBody>
-      </p:sp>
-      <p:sp>
-        <p:nvSpPr>
-          <p:cNvPr id="3" name="Content Placeholder 2">
-            <a:extLst>
-              <a:ext uri="{FF2B5EF4-FFF2-40B4-BE49-F238E27FC236}">
-                <a16:creationId xmlns:a16="http://schemas.microsoft.com/office/drawing/2014/main" id="{A687CC1B-A7CC-46FB-9302-09A7091C47D1}"/>
-              </a:ext>
-            </a:extLst>
-          </p:cNvPr>
-          <p:cNvSpPr>
-            <a:spLocks noGrp="1"/>
-          </p:cNvSpPr>
-          <p:nvPr>
-            <p:ph idx="1"/>
-          </p:nvPr>
-        </p:nvSpPr>
-        <p:spPr>
-          <a:xfrm>
-            <a:off x="685800" y="2364573"/>
-            <a:ext cx="3977639" cy="3854112"/>
-          </a:xfrm>
-        </p:spPr>
-        <p:txBody>
-          <a:bodyPr>
-            <a:normAutofit/>
-          </a:bodyPr>
-          <a:lstStyle/>
-          <a:p>
-            <a:r>
-              <a:rPr lang="en-CA" sz="1600"/>
-              <a:t>E-sports Player manger:</a:t>
-            </a:r>
-          </a:p>
-          <a:p>
-            <a:endParaRPr lang="en-CA" sz="1600"/>
-          </a:p>
-        </p:txBody>
-      </p:sp>
-      <p:sp useBgFill="1">
-        <p:nvSpPr>
-          <p:cNvPr id="10" name="Rectangle 9">
-            <a:extLst>
-              <a:ext uri="{FF2B5EF4-FFF2-40B4-BE49-F238E27FC236}">
-                <a16:creationId xmlns:a16="http://schemas.microsoft.com/office/drawing/2014/main" id="{8D25211A-4CA0-4B53-82BB-1EE7C7F3C725}"/>
+                <a16:creationId xmlns:a16="http://schemas.microsoft.com/office/drawing/2014/main" id="{D9013873-DDB8-4ED0-8ECC-C97272972A4D}"/>
               </a:ext>
               <a:ext uri="{C183D7F6-B498-43B3-948B-1728B52AA6E4}">
                 <adec:decorative xmlns:adec="http://schemas.microsoft.com/office/drawing/2017/decorative" val="1"/>
@@ -5968,8 +6234,8 @@
         </p:nvSpPr>
         <p:spPr>
           <a:xfrm>
-            <a:off x="4951379" y="0"/>
-            <a:ext cx="7240615" cy="6858000"/>
+            <a:off x="0" y="0"/>
+            <a:ext cx="12192000" cy="6858000"/>
           </a:xfrm>
           <a:prstGeom prst="rect">
             <a:avLst/>
@@ -6005,10 +6271,89 @@
       </p:sp>
       <p:pic>
         <p:nvPicPr>
-          <p:cNvPr id="5" name="Picture 4">
+          <p:cNvPr id="24" name="Picture 20">
             <a:extLst>
               <a:ext uri="{FF2B5EF4-FFF2-40B4-BE49-F238E27FC236}">
-                <a16:creationId xmlns:a16="http://schemas.microsoft.com/office/drawing/2014/main" id="{9D8A0C46-CE78-456B-B5C0-ACC02733DBA7}"/>
+                <a16:creationId xmlns:a16="http://schemas.microsoft.com/office/drawing/2014/main" id="{0C3E96B3-6D54-4601-9711-C9F5E46087AA}"/>
+              </a:ext>
+              <a:ext uri="{C183D7F6-B498-43B3-948B-1728B52AA6E4}">
+                <adec:decorative xmlns:adec="http://schemas.microsoft.com/office/drawing/2017/decorative" val="1"/>
+              </a:ext>
+            </a:extLst>
+          </p:cNvPr>
+          <p:cNvPicPr>
+            <a:picLocks noGrp="1" noRot="1" noChangeAspect="1" noMove="1" noResize="1" noEditPoints="1" noAdjustHandles="1" noChangeArrowheads="1" noChangeShapeType="1" noCrop="1"/>
+          </p:cNvPicPr>
+          <p:nvPr>
+            <p:extLst>
+              <p:ext uri="{386F3935-93C4-4BCD-93E2-E3B085C9AB24}">
+                <p16:designElem xmlns:p16="http://schemas.microsoft.com/office/powerpoint/2015/main" val="1"/>
+              </p:ext>
+            </p:extLst>
+          </p:nvPr>
+        </p:nvPicPr>
+        <p:blipFill rotWithShape="1">
+          <a:blip r:embed="rId2">
+            <a:extLst>
+              <a:ext uri="{28A0092B-C50C-407E-A947-70E740481C1C}">
+                <a14:useLocalDpi xmlns:a14="http://schemas.microsoft.com/office/drawing/2010/main" val="0"/>
+              </a:ext>
+            </a:extLst>
+          </a:blip>
+          <a:srcRect r="35781"/>
+          <a:stretch/>
+        </p:blipFill>
+        <p:spPr>
+          <a:xfrm>
+            <a:off x="0" y="0"/>
+            <a:ext cx="7829550" cy="1441450"/>
+          </a:xfrm>
+          <a:prstGeom prst="rect">
+            <a:avLst/>
+          </a:prstGeom>
+        </p:spPr>
+      </p:pic>
+      <p:sp>
+        <p:nvSpPr>
+          <p:cNvPr id="2" name="Title 1">
+            <a:extLst>
+              <a:ext uri="{FF2B5EF4-FFF2-40B4-BE49-F238E27FC236}">
+                <a16:creationId xmlns:a16="http://schemas.microsoft.com/office/drawing/2014/main" id="{4E0BB5D3-DDD7-4161-923F-9AE2D200AAB5}"/>
+              </a:ext>
+            </a:extLst>
+          </p:cNvPr>
+          <p:cNvSpPr>
+            <a:spLocks noGrp="1"/>
+          </p:cNvSpPr>
+          <p:nvPr>
+            <p:ph type="title"/>
+          </p:nvPr>
+        </p:nvSpPr>
+        <p:spPr>
+          <a:xfrm>
+            <a:off x="685799" y="764373"/>
+            <a:ext cx="6848855" cy="1293028"/>
+          </a:xfrm>
+        </p:spPr>
+        <p:txBody>
+          <a:bodyPr>
+            <a:normAutofit/>
+          </a:bodyPr>
+          <a:lstStyle/>
+          <a:p>
+            <a:r>
+              <a:rPr lang="en-CA" sz="2800" dirty="0"/>
+              <a:t>Problem-rapid-growth</a:t>
+            </a:r>
+          </a:p>
+        </p:txBody>
+      </p:sp>
+      <p:pic>
+        <p:nvPicPr>
+          <p:cNvPr id="9" name="Picture 8">
+            <a:extLst>
+              <a:ext uri="{FF2B5EF4-FFF2-40B4-BE49-F238E27FC236}">
+                <a16:creationId xmlns:a16="http://schemas.microsoft.com/office/drawing/2014/main" id="{354C9786-DA59-4F6D-A7DD-839B76792A15}"/>
               </a:ext>
             </a:extLst>
           </p:cNvPr>
@@ -6018,14 +6363,184 @@
           <p:nvPr/>
         </p:nvPicPr>
         <p:blipFill rotWithShape="1">
-          <a:blip r:embed="rId2"/>
-          <a:srcRect r="10361"/>
+          <a:blip r:embed="rId3"/>
+          <a:srcRect t="7488" b="31880"/>
           <a:stretch/>
         </p:blipFill>
         <p:spPr>
           <a:xfrm>
-            <a:off x="5304147" y="10"/>
-            <a:ext cx="6887853" cy="6857990"/>
+            <a:off x="8112631" y="10"/>
+            <a:ext cx="4079369" cy="1645910"/>
+          </a:xfrm>
+          <a:prstGeom prst="rect">
+            <a:avLst/>
+          </a:prstGeom>
+        </p:spPr>
+      </p:pic>
+      <p:sp>
+        <p:nvSpPr>
+          <p:cNvPr id="25" name="Content Placeholder 15">
+            <a:extLst>
+              <a:ext uri="{FF2B5EF4-FFF2-40B4-BE49-F238E27FC236}">
+                <a16:creationId xmlns:a16="http://schemas.microsoft.com/office/drawing/2014/main" id="{195C0924-F523-45F9-810E-CFD8E2EBD511}"/>
+              </a:ext>
+            </a:extLst>
+          </p:cNvPr>
+          <p:cNvSpPr>
+            <a:spLocks noGrp="1"/>
+          </p:cNvSpPr>
+          <p:nvPr>
+            <p:ph idx="1"/>
+          </p:nvPr>
+        </p:nvSpPr>
+        <p:spPr>
+          <a:xfrm>
+            <a:off x="685800" y="2194560"/>
+            <a:ext cx="6848854" cy="4024125"/>
+          </a:xfrm>
+        </p:spPr>
+        <p:txBody>
+          <a:bodyPr>
+            <a:normAutofit/>
+          </a:bodyPr>
+          <a:lstStyle/>
+          <a:p>
+            <a:r>
+              <a:rPr lang="en-US" dirty="0"/>
+              <a:t>Why is rapid growth a problem?</a:t>
+            </a:r>
+          </a:p>
+          <a:p>
+            <a:pPr lvl="1"/>
+            <a:endParaRPr lang="en-US" dirty="0"/>
+          </a:p>
+          <a:p>
+            <a:pPr lvl="1"/>
+            <a:r>
+              <a:rPr lang="en-US" dirty="0"/>
+              <a:t>Lack of experienced professionals in business and legal.</a:t>
+            </a:r>
+          </a:p>
+          <a:p>
+            <a:pPr lvl="1"/>
+            <a:r>
+              <a:rPr lang="en-US" dirty="0"/>
+              <a:t>Leading to mismanaged teams</a:t>
+            </a:r>
+          </a:p>
+          <a:p>
+            <a:pPr lvl="1"/>
+            <a:r>
+              <a:rPr lang="en-US" dirty="0"/>
+              <a:t>Poor player lifestyle.</a:t>
+            </a:r>
+          </a:p>
+          <a:p>
+            <a:pPr lvl="1"/>
+            <a:r>
+              <a:rPr lang="en-US" dirty="0"/>
+              <a:t> Players taken advantage of. Bad contracts, unreasonable hours, short professional career</a:t>
+            </a:r>
+          </a:p>
+          <a:p>
+            <a:pPr lvl="1"/>
+            <a:r>
+              <a:rPr lang="en-US" dirty="0"/>
+              <a:t>General lack of support regarding the business side of esports.</a:t>
+            </a:r>
+          </a:p>
+          <a:p>
+            <a:pPr marL="0" indent="0">
+              <a:buNone/>
+            </a:pPr>
+            <a:r>
+              <a:rPr lang="en-US" dirty="0"/>
+              <a:t>	</a:t>
+            </a:r>
+          </a:p>
+        </p:txBody>
+      </p:sp>
+      <p:pic>
+        <p:nvPicPr>
+          <p:cNvPr id="7" name="Picture 6">
+            <a:extLst>
+              <a:ext uri="{FF2B5EF4-FFF2-40B4-BE49-F238E27FC236}">
+                <a16:creationId xmlns:a16="http://schemas.microsoft.com/office/drawing/2014/main" id="{E73A47F2-1733-4A2B-80B5-DC1A482A30F0}"/>
+              </a:ext>
+            </a:extLst>
+          </p:cNvPr>
+          <p:cNvPicPr>
+            <a:picLocks noChangeAspect="1"/>
+          </p:cNvPicPr>
+          <p:nvPr/>
+        </p:nvPicPr>
+        <p:blipFill rotWithShape="1">
+          <a:blip r:embed="rId4"/>
+          <a:srcRect t="8631" r="-2" b="10673"/>
+          <a:stretch/>
+        </p:blipFill>
+        <p:spPr>
+          <a:xfrm>
+            <a:off x="8112631" y="1737360"/>
+            <a:ext cx="4079369" cy="1645920"/>
+          </a:xfrm>
+          <a:prstGeom prst="rect">
+            <a:avLst/>
+          </a:prstGeom>
+        </p:spPr>
+      </p:pic>
+      <p:pic>
+        <p:nvPicPr>
+          <p:cNvPr id="11" name="Picture 10">
+            <a:extLst>
+              <a:ext uri="{FF2B5EF4-FFF2-40B4-BE49-F238E27FC236}">
+                <a16:creationId xmlns:a16="http://schemas.microsoft.com/office/drawing/2014/main" id="{174EADD4-06F8-420B-A84D-50E76F869DCF}"/>
+              </a:ext>
+            </a:extLst>
+          </p:cNvPr>
+          <p:cNvPicPr>
+            <a:picLocks noChangeAspect="1"/>
+          </p:cNvPicPr>
+          <p:nvPr/>
+        </p:nvPicPr>
+        <p:blipFill rotWithShape="1">
+          <a:blip r:embed="rId5"/>
+          <a:srcRect t="10199" r="-3" b="17991"/>
+          <a:stretch/>
+        </p:blipFill>
+        <p:spPr>
+          <a:xfrm>
+            <a:off x="8112631" y="3474720"/>
+            <a:ext cx="4079369" cy="1645920"/>
+          </a:xfrm>
+          <a:prstGeom prst="rect">
+            <a:avLst/>
+          </a:prstGeom>
+        </p:spPr>
+      </p:pic>
+      <p:pic>
+        <p:nvPicPr>
+          <p:cNvPr id="26" name="Content Placeholder 4">
+            <a:extLst>
+              <a:ext uri="{FF2B5EF4-FFF2-40B4-BE49-F238E27FC236}">
+                <a16:creationId xmlns:a16="http://schemas.microsoft.com/office/drawing/2014/main" id="{2656661D-F2C6-4BAB-908A-41D6F38EB237}"/>
+              </a:ext>
+            </a:extLst>
+          </p:cNvPr>
+          <p:cNvPicPr>
+            <a:picLocks noChangeAspect="1"/>
+          </p:cNvPicPr>
+          <p:nvPr/>
+        </p:nvPicPr>
+        <p:blipFill rotWithShape="1">
+          <a:blip r:embed="rId6"/>
+          <a:srcRect t="11022" r="-3" b="-3"/>
+          <a:stretch/>
+        </p:blipFill>
+        <p:spPr>
+          <a:xfrm>
+            <a:off x="8112631" y="5212080"/>
+            <a:ext cx="4079369" cy="1645920"/>
           </a:xfrm>
           <a:prstGeom prst="rect">
             <a:avLst/>
@@ -6035,7 +6550,7 @@
     </p:spTree>
     <p:extLst>
       <p:ext uri="{BB962C8B-B14F-4D97-AF65-F5344CB8AC3E}">
-        <p14:creationId xmlns:p14="http://schemas.microsoft.com/office/powerpoint/2010/main" val="2496220051"/>
+        <p14:creationId xmlns:p14="http://schemas.microsoft.com/office/powerpoint/2010/main" val="3784933388"/>
       </p:ext>
     </p:extLst>
   </p:cSld>
@@ -6067,7 +6582,7 @@
           <p:cNvPr id="2" name="Title 1">
             <a:extLst>
               <a:ext uri="{FF2B5EF4-FFF2-40B4-BE49-F238E27FC236}">
-                <a16:creationId xmlns:a16="http://schemas.microsoft.com/office/drawing/2014/main" id="{5052E9FB-DC39-423A-90AC-FE4A3A6F86F3}"/>
+                <a16:creationId xmlns:a16="http://schemas.microsoft.com/office/drawing/2014/main" id="{A384375E-3C8C-43AC-AB18-7E7FB941AE65}"/>
               </a:ext>
             </a:extLst>
           </p:cNvPr>
@@ -6085,40 +6600,44 @@
           <a:p>
             <a:r>
               <a:rPr lang="en-CA" dirty="0"/>
-              <a:t>Talk to your user</a:t>
-            </a:r>
-          </a:p>
-        </p:txBody>
-      </p:sp>
-      <p:sp>
-        <p:nvSpPr>
-          <p:cNvPr id="3" name="Content Placeholder 2">
+              <a:t>Problem-lack of understanding</a:t>
+            </a:r>
+          </a:p>
+        </p:txBody>
+      </p:sp>
+      <p:pic>
+        <p:nvPicPr>
+          <p:cNvPr id="8" name="Content Placeholder 4">
             <a:extLst>
               <a:ext uri="{FF2B5EF4-FFF2-40B4-BE49-F238E27FC236}">
-                <a16:creationId xmlns:a16="http://schemas.microsoft.com/office/drawing/2014/main" id="{0FEDF32F-3E49-424C-BB0E-E68353F38682}"/>
+                <a16:creationId xmlns:a16="http://schemas.microsoft.com/office/drawing/2014/main" id="{6B73E1D0-3113-4E01-801B-609F5C80925B}"/>
               </a:ext>
             </a:extLst>
           </p:cNvPr>
-          <p:cNvSpPr>
-            <a:spLocks noGrp="1"/>
-          </p:cNvSpPr>
+          <p:cNvPicPr>
+            <a:picLocks noGrp="1" noChangeAspect="1"/>
+          </p:cNvPicPr>
           <p:nvPr>
             <p:ph idx="1"/>
           </p:nvPr>
-        </p:nvSpPr>
-        <p:spPr/>
-        <p:txBody>
-          <a:bodyPr/>
-          <a:lstStyle/>
-          <a:p>
-            <a:endParaRPr lang="en-CA"/>
-          </a:p>
-        </p:txBody>
-      </p:sp>
+        </p:nvPicPr>
+        <p:blipFill>
+          <a:blip r:embed="rId2"/>
+          <a:stretch>
+            <a:fillRect/>
+          </a:stretch>
+        </p:blipFill>
+        <p:spPr>
+          <a:xfrm>
+            <a:off x="3413125" y="2193925"/>
+            <a:ext cx="5365750" cy="4024313"/>
+          </a:xfrm>
+        </p:spPr>
+      </p:pic>
     </p:spTree>
     <p:extLst>
       <p:ext uri="{BB962C8B-B14F-4D97-AF65-F5344CB8AC3E}">
-        <p14:creationId xmlns:p14="http://schemas.microsoft.com/office/powerpoint/2010/main" val="1934468901"/>
+        <p14:creationId xmlns:p14="http://schemas.microsoft.com/office/powerpoint/2010/main" val="361759928"/>
       </p:ext>
     </p:extLst>
   </p:cSld>
@@ -6129,6 +6648,938 @@
 </file>
 
 <file path=ppt/slides/slide5.xml><?xml version="1.0" encoding="utf-8"?>
+<p:sld xmlns:a="http://schemas.openxmlformats.org/drawingml/2006/main" xmlns:r="http://schemas.openxmlformats.org/officeDocument/2006/relationships" xmlns:p="http://schemas.openxmlformats.org/presentationml/2006/main">
+  <p:cSld>
+    <p:bg>
+      <p:bgPr>
+        <a:solidFill>
+          <a:schemeClr val="bg1"/>
+        </a:solidFill>
+        <a:effectLst/>
+      </p:bgPr>
+    </p:bg>
+    <p:spTree>
+      <p:nvGrpSpPr>
+        <p:cNvPr id="1" name=""/>
+        <p:cNvGrpSpPr/>
+        <p:nvPr/>
+      </p:nvGrpSpPr>
+      <p:grpSpPr>
+        <a:xfrm>
+          <a:off x="0" y="0"/>
+          <a:ext cx="0" cy="0"/>
+          <a:chOff x="0" y="0"/>
+          <a:chExt cx="0" cy="0"/>
+        </a:xfrm>
+      </p:grpSpPr>
+      <p:sp>
+        <p:nvSpPr>
+          <p:cNvPr id="10" name="Rectangle 9">
+            <a:extLst>
+              <a:ext uri="{FF2B5EF4-FFF2-40B4-BE49-F238E27FC236}">
+                <a16:creationId xmlns:a16="http://schemas.microsoft.com/office/drawing/2014/main" id="{1EA5387D-64D8-4D6C-B109-FF4E81DF609A}"/>
+              </a:ext>
+              <a:ext uri="{C183D7F6-B498-43B3-948B-1728B52AA6E4}">
+                <adec:decorative xmlns:adec="http://schemas.microsoft.com/office/drawing/2017/decorative" val="1"/>
+              </a:ext>
+            </a:extLst>
+          </p:cNvPr>
+          <p:cNvSpPr>
+            <a:spLocks noGrp="1" noRot="1" noChangeAspect="1" noMove="1" noResize="1" noEditPoints="1" noAdjustHandles="1" noChangeArrowheads="1" noChangeShapeType="1" noTextEdit="1"/>
+          </p:cNvSpPr>
+          <p:nvPr>
+            <p:extLst>
+              <p:ext uri="{386F3935-93C4-4BCD-93E2-E3B085C9AB24}">
+                <p16:designElem xmlns:p16="http://schemas.microsoft.com/office/powerpoint/2015/main" val="1"/>
+              </p:ext>
+            </p:extLst>
+          </p:nvPr>
+        </p:nvSpPr>
+        <p:spPr>
+          <a:xfrm>
+            <a:off x="0" y="0"/>
+            <a:ext cx="12192000" cy="6858000"/>
+          </a:xfrm>
+          <a:prstGeom prst="rect">
+            <a:avLst/>
+          </a:prstGeom>
+          <a:solidFill>
+            <a:schemeClr val="bg1"/>
+          </a:solidFill>
+          <a:ln>
+            <a:noFill/>
+          </a:ln>
+        </p:spPr>
+        <p:style>
+          <a:lnRef idx="2">
+            <a:schemeClr val="accent1">
+              <a:shade val="50000"/>
+            </a:schemeClr>
+          </a:lnRef>
+          <a:fillRef idx="1">
+            <a:schemeClr val="accent1"/>
+          </a:fillRef>
+          <a:effectRef idx="0">
+            <a:schemeClr val="accent1"/>
+          </a:effectRef>
+          <a:fontRef idx="minor">
+            <a:schemeClr val="lt1"/>
+          </a:fontRef>
+        </p:style>
+        <p:txBody>
+          <a:bodyPr rtlCol="0" anchor="ctr"/>
+          <a:lstStyle/>
+          <a:p>
+            <a:pPr algn="ctr"/>
+            <a:endParaRPr lang="en-US"/>
+          </a:p>
+        </p:txBody>
+      </p:sp>
+      <p:pic>
+        <p:nvPicPr>
+          <p:cNvPr id="5" name="Picture 4">
+            <a:extLst>
+              <a:ext uri="{FF2B5EF4-FFF2-40B4-BE49-F238E27FC236}">
+                <a16:creationId xmlns:a16="http://schemas.microsoft.com/office/drawing/2014/main" id="{3229A000-F3B3-4F85-A6CB-61681792EA83}"/>
+              </a:ext>
+            </a:extLst>
+          </p:cNvPr>
+          <p:cNvPicPr>
+            <a:picLocks noChangeAspect="1"/>
+          </p:cNvPicPr>
+          <p:nvPr/>
+        </p:nvPicPr>
+        <p:blipFill rotWithShape="1">
+          <a:blip r:embed="rId2">
+            <a:alphaModFix amt="30000"/>
+            <a:extLst/>
+          </a:blip>
+          <a:srcRect t="16666" b="8334"/>
+          <a:stretch/>
+        </p:blipFill>
+        <p:spPr>
+          <a:xfrm>
+            <a:off x="20" y="10"/>
+            <a:ext cx="12191980" cy="6857990"/>
+          </a:xfrm>
+          <a:prstGeom prst="rect">
+            <a:avLst/>
+          </a:prstGeom>
+        </p:spPr>
+      </p:pic>
+      <p:sp>
+        <p:nvSpPr>
+          <p:cNvPr id="2" name="Title 1">
+            <a:extLst>
+              <a:ext uri="{FF2B5EF4-FFF2-40B4-BE49-F238E27FC236}">
+                <a16:creationId xmlns:a16="http://schemas.microsoft.com/office/drawing/2014/main" id="{A0F50593-ABA4-4092-9569-5A423C42E604}"/>
+              </a:ext>
+            </a:extLst>
+          </p:cNvPr>
+          <p:cNvSpPr>
+            <a:spLocks noGrp="1"/>
+          </p:cNvSpPr>
+          <p:nvPr>
+            <p:ph type="title"/>
+          </p:nvPr>
+        </p:nvSpPr>
+        <p:spPr>
+          <a:xfrm>
+            <a:off x="2895600" y="764373"/>
+            <a:ext cx="8610600" cy="1293028"/>
+          </a:xfrm>
+        </p:spPr>
+        <p:txBody>
+          <a:bodyPr>
+            <a:normAutofit/>
+          </a:bodyPr>
+          <a:lstStyle/>
+          <a:p>
+            <a:r>
+              <a:rPr lang="en-CA" dirty="0"/>
+              <a:t>Lack of understanding</a:t>
+            </a:r>
+          </a:p>
+        </p:txBody>
+      </p:sp>
+      <p:sp>
+        <p:nvSpPr>
+          <p:cNvPr id="3" name="Content Placeholder 2">
+            <a:extLst>
+              <a:ext uri="{FF2B5EF4-FFF2-40B4-BE49-F238E27FC236}">
+                <a16:creationId xmlns:a16="http://schemas.microsoft.com/office/drawing/2014/main" id="{FB873DE7-C113-47A4-A82C-835264181CED}"/>
+              </a:ext>
+            </a:extLst>
+          </p:cNvPr>
+          <p:cNvSpPr>
+            <a:spLocks noGrp="1"/>
+          </p:cNvSpPr>
+          <p:nvPr>
+            <p:ph idx="1"/>
+          </p:nvPr>
+        </p:nvSpPr>
+        <p:spPr>
+          <a:xfrm>
+            <a:off x="685800" y="2194560"/>
+            <a:ext cx="10820400" cy="4024125"/>
+          </a:xfrm>
+        </p:spPr>
+        <p:txBody>
+          <a:bodyPr>
+            <a:normAutofit/>
+          </a:bodyPr>
+          <a:lstStyle/>
+          <a:p>
+            <a:r>
+              <a:rPr lang="en-CA" dirty="0"/>
+              <a:t>A career based around videogames?</a:t>
+            </a:r>
+          </a:p>
+          <a:p>
+            <a:pPr lvl="1"/>
+            <a:r>
+              <a:rPr lang="en-CA" dirty="0"/>
+              <a:t>A new type of career, one which is based around something that is traditionally treated as a leisure.</a:t>
+            </a:r>
+          </a:p>
+          <a:p>
+            <a:pPr lvl="1"/>
+            <a:r>
+              <a:rPr lang="en-CA" dirty="0"/>
+              <a:t>Historically, videogames have been seen as a waste of time.</a:t>
+            </a:r>
+          </a:p>
+          <a:p>
+            <a:pPr lvl="1"/>
+            <a:r>
+              <a:rPr lang="en-CA" dirty="0"/>
+              <a:t>Has only “really” become huge in the last decade.</a:t>
+            </a:r>
+          </a:p>
+          <a:p>
+            <a:pPr lvl="1"/>
+            <a:r>
+              <a:rPr lang="en-CA" dirty="0"/>
+              <a:t>A lot of players are young adults.</a:t>
+            </a:r>
+          </a:p>
+          <a:p>
+            <a:pPr lvl="1"/>
+            <a:r>
+              <a:rPr lang="en-CA" dirty="0"/>
+              <a:t>Parents don’t understand!</a:t>
+            </a:r>
+          </a:p>
+        </p:txBody>
+      </p:sp>
+    </p:spTree>
+    <p:extLst>
+      <p:ext uri="{BB962C8B-B14F-4D97-AF65-F5344CB8AC3E}">
+        <p14:creationId xmlns:p14="http://schemas.microsoft.com/office/powerpoint/2010/main" val="1010281515"/>
+      </p:ext>
+    </p:extLst>
+  </p:cSld>
+  <p:clrMapOvr>
+    <a:masterClrMapping/>
+  </p:clrMapOvr>
+</p:sld>
+</file>
+
+<file path=ppt/slides/slide6.xml><?xml version="1.0" encoding="utf-8"?>
+<p:sld xmlns:a="http://schemas.openxmlformats.org/drawingml/2006/main" xmlns:r="http://schemas.openxmlformats.org/officeDocument/2006/relationships" xmlns:p="http://schemas.openxmlformats.org/presentationml/2006/main">
+  <p:cSld>
+    <p:bg>
+      <p:bgPr>
+        <a:solidFill>
+          <a:schemeClr val="bg1"/>
+        </a:solidFill>
+        <a:effectLst/>
+      </p:bgPr>
+    </p:bg>
+    <p:spTree>
+      <p:nvGrpSpPr>
+        <p:cNvPr id="1" name=""/>
+        <p:cNvGrpSpPr/>
+        <p:nvPr/>
+      </p:nvGrpSpPr>
+      <p:grpSpPr>
+        <a:xfrm>
+          <a:off x="0" y="0"/>
+          <a:ext cx="0" cy="0"/>
+          <a:chOff x="0" y="0"/>
+          <a:chExt cx="0" cy="0"/>
+        </a:xfrm>
+      </p:grpSpPr>
+      <p:pic>
+        <p:nvPicPr>
+          <p:cNvPr id="18" name="Picture 17">
+            <a:extLst>
+              <a:ext uri="{FF2B5EF4-FFF2-40B4-BE49-F238E27FC236}">
+                <a16:creationId xmlns:a16="http://schemas.microsoft.com/office/drawing/2014/main" id="{CFD580F5-E7BF-4C1D-BEFD-4A4601EBA876}"/>
+              </a:ext>
+              <a:ext uri="{C183D7F6-B498-43B3-948B-1728B52AA6E4}">
+                <adec:decorative xmlns:adec="http://schemas.microsoft.com/office/drawing/2017/decorative" val="1"/>
+              </a:ext>
+            </a:extLst>
+          </p:cNvPr>
+          <p:cNvPicPr>
+            <a:picLocks noGrp="1" noRot="1" noChangeAspect="1" noMove="1" noResize="1" noEditPoints="1" noAdjustHandles="1" noChangeArrowheads="1" noChangeShapeType="1" noCrop="1"/>
+          </p:cNvPicPr>
+          <p:nvPr>
+            <p:extLst>
+              <p:ext uri="{386F3935-93C4-4BCD-93E2-E3B085C9AB24}">
+                <p16:designElem xmlns:p16="http://schemas.microsoft.com/office/powerpoint/2015/main" val="1"/>
+              </p:ext>
+            </p:extLst>
+          </p:nvPr>
+        </p:nvPicPr>
+        <p:blipFill>
+          <a:blip r:embed="rId2">
+            <a:extLst>
+              <a:ext uri="{28A0092B-C50C-407E-A947-70E740481C1C}">
+                <a14:useLocalDpi xmlns:a14="http://schemas.microsoft.com/office/drawing/2010/main" val="0"/>
+              </a:ext>
+            </a:extLst>
+          </a:blip>
+          <a:stretch>
+            <a:fillRect/>
+          </a:stretch>
+        </p:blipFill>
+        <p:spPr>
+          <a:xfrm>
+            <a:off x="0" y="0"/>
+            <a:ext cx="12192000" cy="1441450"/>
+          </a:xfrm>
+          <a:prstGeom prst="rect">
+            <a:avLst/>
+          </a:prstGeom>
+        </p:spPr>
+      </p:pic>
+      <p:pic>
+        <p:nvPicPr>
+          <p:cNvPr id="20" name="Picture 19">
+            <a:extLst>
+              <a:ext uri="{FF2B5EF4-FFF2-40B4-BE49-F238E27FC236}">
+                <a16:creationId xmlns:a16="http://schemas.microsoft.com/office/drawing/2014/main" id="{F0F06750-78FE-4472-8DA5-14CF3336F811}"/>
+              </a:ext>
+              <a:ext uri="{C183D7F6-B498-43B3-948B-1728B52AA6E4}">
+                <adec:decorative xmlns:adec="http://schemas.microsoft.com/office/drawing/2017/decorative" val="1"/>
+              </a:ext>
+            </a:extLst>
+          </p:cNvPr>
+          <p:cNvPicPr>
+            <a:picLocks noGrp="1" noRot="1" noChangeAspect="1" noMove="1" noResize="1" noEditPoints="1" noAdjustHandles="1" noChangeArrowheads="1" noChangeShapeType="1" noCrop="1"/>
+          </p:cNvPicPr>
+          <p:nvPr>
+            <p:extLst>
+              <p:ext uri="{386F3935-93C4-4BCD-93E2-E3B085C9AB24}">
+                <p16:designElem xmlns:p16="http://schemas.microsoft.com/office/powerpoint/2015/main" val="1"/>
+              </p:ext>
+            </p:extLst>
+          </p:nvPr>
+        </p:nvPicPr>
+        <p:blipFill>
+          <a:blip r:embed="rId3">
+            <a:extLst>
+              <a:ext uri="{28A0092B-C50C-407E-A947-70E740481C1C}">
+                <a14:useLocalDpi xmlns:a14="http://schemas.microsoft.com/office/drawing/2010/main" val="0"/>
+              </a:ext>
+            </a:extLst>
+          </a:blip>
+          <a:stretch>
+            <a:fillRect/>
+          </a:stretch>
+        </p:blipFill>
+        <p:spPr>
+          <a:xfrm>
+            <a:off x="0" y="4375150"/>
+            <a:ext cx="12192000" cy="2482850"/>
+          </a:xfrm>
+          <a:prstGeom prst="rect">
+            <a:avLst/>
+          </a:prstGeom>
+        </p:spPr>
+      </p:pic>
+      <p:pic>
+        <p:nvPicPr>
+          <p:cNvPr id="8" name="Content Placeholder 4">
+            <a:extLst>
+              <a:ext uri="{FF2B5EF4-FFF2-40B4-BE49-F238E27FC236}">
+                <a16:creationId xmlns:a16="http://schemas.microsoft.com/office/drawing/2014/main" id="{75706A7C-3327-4DB6-8C5C-4CB837DAFB07}"/>
+              </a:ext>
+            </a:extLst>
+          </p:cNvPr>
+          <p:cNvPicPr>
+            <a:picLocks noChangeAspect="1"/>
+          </p:cNvPicPr>
+          <p:nvPr/>
+        </p:nvPicPr>
+        <p:blipFill rotWithShape="1">
+          <a:blip r:embed="rId4">
+            <a:alphaModFix amt="40000"/>
+            <a:extLst/>
+          </a:blip>
+          <a:srcRect l="6667"/>
+          <a:stretch/>
+        </p:blipFill>
+        <p:spPr>
+          <a:xfrm>
+            <a:off x="20" y="10"/>
+            <a:ext cx="12191980" cy="6857990"/>
+          </a:xfrm>
+          <a:prstGeom prst="rect">
+            <a:avLst/>
+          </a:prstGeom>
+        </p:spPr>
+      </p:pic>
+      <p:sp>
+        <p:nvSpPr>
+          <p:cNvPr id="2" name="Title 1">
+            <a:extLst>
+              <a:ext uri="{FF2B5EF4-FFF2-40B4-BE49-F238E27FC236}">
+                <a16:creationId xmlns:a16="http://schemas.microsoft.com/office/drawing/2014/main" id="{C20E38C2-BEF9-4F67-ADC0-4121A3630AD0}"/>
+              </a:ext>
+            </a:extLst>
+          </p:cNvPr>
+          <p:cNvSpPr>
+            <a:spLocks noGrp="1"/>
+          </p:cNvSpPr>
+          <p:nvPr>
+            <p:ph type="title"/>
+          </p:nvPr>
+        </p:nvSpPr>
+        <p:spPr>
+          <a:xfrm>
+            <a:off x="1371600" y="2237173"/>
+            <a:ext cx="9448800" cy="2602062"/>
+          </a:xfrm>
+        </p:spPr>
+        <p:txBody>
+          <a:bodyPr vert="horz" lIns="91440" tIns="45720" rIns="91440" bIns="45720" rtlCol="0" anchor="b">
+            <a:normAutofit/>
+          </a:bodyPr>
+          <a:lstStyle/>
+          <a:p>
+            <a:pPr algn="l"/>
+            <a:r>
+              <a:rPr lang="en-US" sz="6000"/>
+              <a:t>Problem-young people?</a:t>
+            </a:r>
+          </a:p>
+        </p:txBody>
+      </p:sp>
+    </p:spTree>
+    <p:extLst>
+      <p:ext uri="{BB962C8B-B14F-4D97-AF65-F5344CB8AC3E}">
+        <p14:creationId xmlns:p14="http://schemas.microsoft.com/office/powerpoint/2010/main" val="1087930761"/>
+      </p:ext>
+    </p:extLst>
+  </p:cSld>
+  <p:clrMapOvr>
+    <a:masterClrMapping/>
+  </p:clrMapOvr>
+</p:sld>
+</file>
+
+<file path=ppt/slides/slide7.xml><?xml version="1.0" encoding="utf-8"?>
+<p:sld xmlns:a="http://schemas.openxmlformats.org/drawingml/2006/main" xmlns:r="http://schemas.openxmlformats.org/officeDocument/2006/relationships" xmlns:p="http://schemas.openxmlformats.org/presentationml/2006/main">
+  <p:cSld>
+    <p:bg>
+      <p:bgPr>
+        <a:solidFill>
+          <a:schemeClr val="bg1"/>
+        </a:solidFill>
+        <a:effectLst/>
+      </p:bgPr>
+    </p:bg>
+    <p:spTree>
+      <p:nvGrpSpPr>
+        <p:cNvPr id="1" name=""/>
+        <p:cNvGrpSpPr/>
+        <p:nvPr/>
+      </p:nvGrpSpPr>
+      <p:grpSpPr>
+        <a:xfrm>
+          <a:off x="0" y="0"/>
+          <a:ext cx="0" cy="0"/>
+          <a:chOff x="0" y="0"/>
+          <a:chExt cx="0" cy="0"/>
+        </a:xfrm>
+      </p:grpSpPr>
+      <p:sp>
+        <p:nvSpPr>
+          <p:cNvPr id="13" name="Rectangle 9">
+            <a:extLst>
+              <a:ext uri="{FF2B5EF4-FFF2-40B4-BE49-F238E27FC236}">
+                <a16:creationId xmlns:a16="http://schemas.microsoft.com/office/drawing/2014/main" id="{1EA5387D-64D8-4D6C-B109-FF4E81DF609A}"/>
+              </a:ext>
+              <a:ext uri="{C183D7F6-B498-43B3-948B-1728B52AA6E4}">
+                <adec:decorative xmlns:adec="http://schemas.microsoft.com/office/drawing/2017/decorative" val="1"/>
+              </a:ext>
+            </a:extLst>
+          </p:cNvPr>
+          <p:cNvSpPr>
+            <a:spLocks noGrp="1" noRot="1" noChangeAspect="1" noMove="1" noResize="1" noEditPoints="1" noAdjustHandles="1" noChangeArrowheads="1" noChangeShapeType="1" noTextEdit="1"/>
+          </p:cNvSpPr>
+          <p:nvPr>
+            <p:extLst>
+              <p:ext uri="{386F3935-93C4-4BCD-93E2-E3B085C9AB24}">
+                <p16:designElem xmlns:p16="http://schemas.microsoft.com/office/powerpoint/2015/main" val="1"/>
+              </p:ext>
+            </p:extLst>
+          </p:nvPr>
+        </p:nvSpPr>
+        <p:spPr>
+          <a:xfrm>
+            <a:off x="0" y="0"/>
+            <a:ext cx="12192000" cy="6858000"/>
+          </a:xfrm>
+          <a:prstGeom prst="rect">
+            <a:avLst/>
+          </a:prstGeom>
+          <a:solidFill>
+            <a:schemeClr val="bg1"/>
+          </a:solidFill>
+          <a:ln>
+            <a:noFill/>
+          </a:ln>
+        </p:spPr>
+        <p:style>
+          <a:lnRef idx="2">
+            <a:schemeClr val="accent1">
+              <a:shade val="50000"/>
+            </a:schemeClr>
+          </a:lnRef>
+          <a:fillRef idx="1">
+            <a:schemeClr val="accent1"/>
+          </a:fillRef>
+          <a:effectRef idx="0">
+            <a:schemeClr val="accent1"/>
+          </a:effectRef>
+          <a:fontRef idx="minor">
+            <a:schemeClr val="lt1"/>
+          </a:fontRef>
+        </p:style>
+        <p:txBody>
+          <a:bodyPr rtlCol="0" anchor="ctr"/>
+          <a:lstStyle/>
+          <a:p>
+            <a:pPr algn="ctr"/>
+            <a:endParaRPr lang="en-US"/>
+          </a:p>
+        </p:txBody>
+      </p:sp>
+      <p:pic>
+        <p:nvPicPr>
+          <p:cNvPr id="5" name="Picture 4">
+            <a:extLst>
+              <a:ext uri="{FF2B5EF4-FFF2-40B4-BE49-F238E27FC236}">
+                <a16:creationId xmlns:a16="http://schemas.microsoft.com/office/drawing/2014/main" id="{9A8F5D27-F04C-4A8D-BB48-6B7D48B715D0}"/>
+              </a:ext>
+            </a:extLst>
+          </p:cNvPr>
+          <p:cNvPicPr>
+            <a:picLocks noChangeAspect="1"/>
+          </p:cNvPicPr>
+          <p:nvPr/>
+        </p:nvPicPr>
+        <p:blipFill rotWithShape="1">
+          <a:blip r:embed="rId2">
+            <a:duotone>
+              <a:prstClr val="black"/>
+              <a:schemeClr val="tx2">
+                <a:tint val="45000"/>
+                <a:satMod val="400000"/>
+              </a:schemeClr>
+            </a:duotone>
+            <a:alphaModFix amt="30000"/>
+            <a:extLst/>
+          </a:blip>
+          <a:srcRect/>
+          <a:stretch/>
+        </p:blipFill>
+        <p:spPr>
+          <a:xfrm>
+            <a:off x="0" y="0"/>
+            <a:ext cx="12192000" cy="6858000"/>
+          </a:xfrm>
+          <a:prstGeom prst="rect">
+            <a:avLst/>
+          </a:prstGeom>
+        </p:spPr>
+      </p:pic>
+      <p:pic>
+        <p:nvPicPr>
+          <p:cNvPr id="12" name="Picture 11">
+            <a:extLst>
+              <a:ext uri="{FF2B5EF4-FFF2-40B4-BE49-F238E27FC236}">
+                <a16:creationId xmlns:a16="http://schemas.microsoft.com/office/drawing/2014/main" id="{6319FFD2-07B5-4029-BFB3-26FCFCC2F1B8}"/>
+              </a:ext>
+              <a:ext uri="{C183D7F6-B498-43B3-948B-1728B52AA6E4}">
+                <adec:decorative xmlns:adec="http://schemas.microsoft.com/office/drawing/2017/decorative" val="1"/>
+              </a:ext>
+            </a:extLst>
+          </p:cNvPr>
+          <p:cNvPicPr>
+            <a:picLocks noGrp="1" noRot="1" noChangeAspect="1" noMove="1" noResize="1" noEditPoints="1" noAdjustHandles="1" noChangeArrowheads="1" noChangeShapeType="1" noCrop="1"/>
+          </p:cNvPicPr>
+          <p:nvPr>
+            <p:extLst>
+              <p:ext uri="{386F3935-93C4-4BCD-93E2-E3B085C9AB24}">
+                <p16:designElem xmlns:p16="http://schemas.microsoft.com/office/powerpoint/2015/main" val="1"/>
+              </p:ext>
+            </p:extLst>
+          </p:nvPr>
+        </p:nvPicPr>
+        <p:blipFill>
+          <a:blip r:embed="rId3">
+            <a:extLst>
+              <a:ext uri="{28A0092B-C50C-407E-A947-70E740481C1C}">
+                <a14:useLocalDpi xmlns:a14="http://schemas.microsoft.com/office/drawing/2010/main" val="0"/>
+              </a:ext>
+            </a:extLst>
+          </a:blip>
+          <a:stretch>
+            <a:fillRect/>
+          </a:stretch>
+        </p:blipFill>
+        <p:spPr>
+          <a:xfrm>
+            <a:off x="0" y="0"/>
+            <a:ext cx="12192000" cy="1441450"/>
+          </a:xfrm>
+          <a:prstGeom prst="rect">
+            <a:avLst/>
+          </a:prstGeom>
+        </p:spPr>
+      </p:pic>
+      <p:sp>
+        <p:nvSpPr>
+          <p:cNvPr id="2" name="Title 1">
+            <a:extLst>
+              <a:ext uri="{FF2B5EF4-FFF2-40B4-BE49-F238E27FC236}">
+                <a16:creationId xmlns:a16="http://schemas.microsoft.com/office/drawing/2014/main" id="{A0F50593-ABA4-4092-9569-5A423C42E604}"/>
+              </a:ext>
+            </a:extLst>
+          </p:cNvPr>
+          <p:cNvSpPr>
+            <a:spLocks noGrp="1"/>
+          </p:cNvSpPr>
+          <p:nvPr>
+            <p:ph type="title"/>
+          </p:nvPr>
+        </p:nvSpPr>
+        <p:spPr>
+          <a:xfrm>
+            <a:off x="2895600" y="764373"/>
+            <a:ext cx="8610600" cy="1293028"/>
+          </a:xfrm>
+        </p:spPr>
+        <p:txBody>
+          <a:bodyPr>
+            <a:normAutofit/>
+          </a:bodyPr>
+          <a:lstStyle/>
+          <a:p>
+            <a:r>
+              <a:rPr lang="en-CA" dirty="0"/>
+              <a:t>Problem-young people</a:t>
+            </a:r>
+          </a:p>
+        </p:txBody>
+      </p:sp>
+      <p:sp>
+        <p:nvSpPr>
+          <p:cNvPr id="3" name="Content Placeholder 2">
+            <a:extLst>
+              <a:ext uri="{FF2B5EF4-FFF2-40B4-BE49-F238E27FC236}">
+                <a16:creationId xmlns:a16="http://schemas.microsoft.com/office/drawing/2014/main" id="{FB873DE7-C113-47A4-A82C-835264181CED}"/>
+              </a:ext>
+            </a:extLst>
+          </p:cNvPr>
+          <p:cNvSpPr>
+            <a:spLocks noGrp="1"/>
+          </p:cNvSpPr>
+          <p:nvPr>
+            <p:ph idx="1"/>
+          </p:nvPr>
+        </p:nvSpPr>
+        <p:spPr>
+          <a:xfrm>
+            <a:off x="685800" y="2194560"/>
+            <a:ext cx="10820400" cy="4024125"/>
+          </a:xfrm>
+        </p:spPr>
+        <p:txBody>
+          <a:bodyPr>
+            <a:normAutofit/>
+          </a:bodyPr>
+          <a:lstStyle/>
+          <a:p>
+            <a:r>
+              <a:rPr lang="en-CA" dirty="0"/>
+              <a:t>A career based around videogames? Really?</a:t>
+            </a:r>
+          </a:p>
+          <a:p>
+            <a:pPr lvl="1"/>
+            <a:r>
+              <a:rPr lang="en-CA" dirty="0"/>
+              <a:t>A majority of aspiring e-sports players are young adults that just graduated high school or in their early to mid twenties.</a:t>
+            </a:r>
+          </a:p>
+          <a:p>
+            <a:pPr lvl="1"/>
+            <a:r>
+              <a:rPr lang="en-CA" dirty="0"/>
+              <a:t>They lack the maturity and knowledge to make sound business decisions.</a:t>
+            </a:r>
+          </a:p>
+          <a:p>
+            <a:pPr lvl="1"/>
+            <a:r>
+              <a:rPr lang="en-CA" dirty="0"/>
+              <a:t>They get locked into terrible contracts.</a:t>
+            </a:r>
+          </a:p>
+          <a:p>
+            <a:pPr lvl="1"/>
+            <a:r>
+              <a:rPr lang="en-CA" dirty="0"/>
+              <a:t>Undergo tremendous amounts of stress (sometimes playing for 10 hours or more a day of practice).</a:t>
+            </a:r>
+          </a:p>
+          <a:p>
+            <a:pPr lvl="1"/>
+            <a:r>
+              <a:rPr lang="en-CA" dirty="0"/>
+              <a:t>On average the career of a professional in e-sports is around two years.</a:t>
+            </a:r>
+          </a:p>
+          <a:p>
+            <a:pPr lvl="1"/>
+            <a:r>
+              <a:rPr lang="en-CA" dirty="0"/>
+              <a:t>What are they left with after that?</a:t>
+            </a:r>
+          </a:p>
+        </p:txBody>
+      </p:sp>
+    </p:spTree>
+    <p:extLst>
+      <p:ext uri="{BB962C8B-B14F-4D97-AF65-F5344CB8AC3E}">
+        <p14:creationId xmlns:p14="http://schemas.microsoft.com/office/powerpoint/2010/main" val="3834321707"/>
+      </p:ext>
+    </p:extLst>
+  </p:cSld>
+  <p:clrMapOvr>
+    <a:masterClrMapping/>
+  </p:clrMapOvr>
+</p:sld>
+</file>
+
+<file path=ppt/slides/slide8.xml><?xml version="1.0" encoding="utf-8"?>
+<p:sld xmlns:a="http://schemas.openxmlformats.org/drawingml/2006/main" xmlns:r="http://schemas.openxmlformats.org/officeDocument/2006/relationships" xmlns:p="http://schemas.openxmlformats.org/presentationml/2006/main">
+  <p:cSld>
+    <p:bg>
+      <p:bgPr>
+        <a:solidFill>
+          <a:schemeClr val="bg1"/>
+        </a:solidFill>
+        <a:effectLst/>
+      </p:bgPr>
+    </p:bg>
+    <p:spTree>
+      <p:nvGrpSpPr>
+        <p:cNvPr id="1" name=""/>
+        <p:cNvGrpSpPr/>
+        <p:nvPr/>
+      </p:nvGrpSpPr>
+      <p:grpSpPr>
+        <a:xfrm>
+          <a:off x="0" y="0"/>
+          <a:ext cx="0" cy="0"/>
+          <a:chOff x="0" y="0"/>
+          <a:chExt cx="0" cy="0"/>
+        </a:xfrm>
+      </p:grpSpPr>
+      <p:sp>
+        <p:nvSpPr>
+          <p:cNvPr id="2" name="Title 1">
+            <a:extLst>
+              <a:ext uri="{FF2B5EF4-FFF2-40B4-BE49-F238E27FC236}">
+                <a16:creationId xmlns:a16="http://schemas.microsoft.com/office/drawing/2014/main" id="{C0012968-7C8C-4CDD-97B6-902A7555D4E0}"/>
+              </a:ext>
+            </a:extLst>
+          </p:cNvPr>
+          <p:cNvSpPr>
+            <a:spLocks noGrp="1"/>
+          </p:cNvSpPr>
+          <p:nvPr>
+            <p:ph type="title"/>
+          </p:nvPr>
+        </p:nvSpPr>
+        <p:spPr>
+          <a:xfrm>
+            <a:off x="685799" y="764373"/>
+            <a:ext cx="3977639" cy="1600200"/>
+          </a:xfrm>
+        </p:spPr>
+        <p:txBody>
+          <a:bodyPr anchor="b">
+            <a:normAutofit/>
+          </a:bodyPr>
+          <a:lstStyle/>
+          <a:p>
+            <a:pPr algn="l"/>
+            <a:r>
+              <a:rPr lang="en-CA" sz="3200"/>
+              <a:t>Target</a:t>
+            </a:r>
+          </a:p>
+        </p:txBody>
+      </p:sp>
+      <p:sp>
+        <p:nvSpPr>
+          <p:cNvPr id="3" name="Content Placeholder 2">
+            <a:extLst>
+              <a:ext uri="{FF2B5EF4-FFF2-40B4-BE49-F238E27FC236}">
+                <a16:creationId xmlns:a16="http://schemas.microsoft.com/office/drawing/2014/main" id="{A687CC1B-A7CC-46FB-9302-09A7091C47D1}"/>
+              </a:ext>
+            </a:extLst>
+          </p:cNvPr>
+          <p:cNvSpPr>
+            <a:spLocks noGrp="1"/>
+          </p:cNvSpPr>
+          <p:nvPr>
+            <p:ph idx="1"/>
+          </p:nvPr>
+        </p:nvSpPr>
+        <p:spPr>
+          <a:xfrm>
+            <a:off x="685800" y="2364573"/>
+            <a:ext cx="3977639" cy="3854112"/>
+          </a:xfrm>
+        </p:spPr>
+        <p:txBody>
+          <a:bodyPr>
+            <a:normAutofit/>
+          </a:bodyPr>
+          <a:lstStyle/>
+          <a:p>
+            <a:r>
+              <a:rPr lang="en-CA" sz="1600"/>
+              <a:t>E-sports Player manger:</a:t>
+            </a:r>
+          </a:p>
+          <a:p>
+            <a:endParaRPr lang="en-CA" sz="1600"/>
+          </a:p>
+        </p:txBody>
+      </p:sp>
+      <p:sp useBgFill="1">
+        <p:nvSpPr>
+          <p:cNvPr id="10" name="Rectangle 9">
+            <a:extLst>
+              <a:ext uri="{FF2B5EF4-FFF2-40B4-BE49-F238E27FC236}">
+                <a16:creationId xmlns:a16="http://schemas.microsoft.com/office/drawing/2014/main" id="{8D25211A-4CA0-4B53-82BB-1EE7C7F3C725}"/>
+              </a:ext>
+              <a:ext uri="{C183D7F6-B498-43B3-948B-1728B52AA6E4}">
+                <adec:decorative xmlns:adec="http://schemas.microsoft.com/office/drawing/2017/decorative" val="1"/>
+              </a:ext>
+            </a:extLst>
+          </p:cNvPr>
+          <p:cNvSpPr>
+            <a:spLocks noGrp="1" noRot="1" noChangeAspect="1" noMove="1" noResize="1" noEditPoints="1" noAdjustHandles="1" noChangeArrowheads="1" noChangeShapeType="1" noTextEdit="1"/>
+          </p:cNvSpPr>
+          <p:nvPr>
+            <p:extLst>
+              <p:ext uri="{386F3935-93C4-4BCD-93E2-E3B085C9AB24}">
+                <p16:designElem xmlns:p16="http://schemas.microsoft.com/office/powerpoint/2015/main" val="1"/>
+              </p:ext>
+            </p:extLst>
+          </p:nvPr>
+        </p:nvSpPr>
+        <p:spPr>
+          <a:xfrm>
+            <a:off x="4951379" y="0"/>
+            <a:ext cx="7240615" cy="6858000"/>
+          </a:xfrm>
+          <a:prstGeom prst="rect">
+            <a:avLst/>
+          </a:prstGeom>
+          <a:ln>
+            <a:noFill/>
+          </a:ln>
+        </p:spPr>
+        <p:style>
+          <a:lnRef idx="2">
+            <a:schemeClr val="accent1">
+              <a:shade val="50000"/>
+            </a:schemeClr>
+          </a:lnRef>
+          <a:fillRef idx="1">
+            <a:schemeClr val="accent1"/>
+          </a:fillRef>
+          <a:effectRef idx="0">
+            <a:schemeClr val="accent1"/>
+          </a:effectRef>
+          <a:fontRef idx="minor">
+            <a:schemeClr val="lt1"/>
+          </a:fontRef>
+        </p:style>
+        <p:txBody>
+          <a:bodyPr rtlCol="0" anchor="ctr"/>
+          <a:lstStyle/>
+          <a:p>
+            <a:pPr algn="ctr"/>
+            <a:endParaRPr lang="en-US"/>
+          </a:p>
+        </p:txBody>
+      </p:sp>
+      <p:pic>
+        <p:nvPicPr>
+          <p:cNvPr id="5" name="Picture 4">
+            <a:extLst>
+              <a:ext uri="{FF2B5EF4-FFF2-40B4-BE49-F238E27FC236}">
+                <a16:creationId xmlns:a16="http://schemas.microsoft.com/office/drawing/2014/main" id="{9D8A0C46-CE78-456B-B5C0-ACC02733DBA7}"/>
+              </a:ext>
+            </a:extLst>
+          </p:cNvPr>
+          <p:cNvPicPr>
+            <a:picLocks noChangeAspect="1"/>
+          </p:cNvPicPr>
+          <p:nvPr/>
+        </p:nvPicPr>
+        <p:blipFill rotWithShape="1">
+          <a:blip r:embed="rId2"/>
+          <a:srcRect r="10361"/>
+          <a:stretch/>
+        </p:blipFill>
+        <p:spPr>
+          <a:xfrm>
+            <a:off x="5304147" y="10"/>
+            <a:ext cx="6887853" cy="6857990"/>
+          </a:xfrm>
+          <a:prstGeom prst="rect">
+            <a:avLst/>
+          </a:prstGeom>
+        </p:spPr>
+      </p:pic>
+    </p:spTree>
+    <p:extLst>
+      <p:ext uri="{BB962C8B-B14F-4D97-AF65-F5344CB8AC3E}">
+        <p14:creationId xmlns:p14="http://schemas.microsoft.com/office/powerpoint/2010/main" val="2496220051"/>
+      </p:ext>
+    </p:extLst>
+  </p:cSld>
+  <p:clrMapOvr>
+    <a:masterClrMapping/>
+  </p:clrMapOvr>
+</p:sld>
+</file>
+
+<file path=ppt/slides/slide9.xml><?xml version="1.0" encoding="utf-8"?>
 <p:sld xmlns:a="http://schemas.openxmlformats.org/drawingml/2006/main" xmlns:r="http://schemas.openxmlformats.org/officeDocument/2006/relationships" xmlns:p="http://schemas.openxmlformats.org/presentationml/2006/main">
   <p:cSld>
     <p:spTree>
@@ -6150,7 +7601,7 @@
           <p:cNvPr id="2" name="Title 1">
             <a:extLst>
               <a:ext uri="{FF2B5EF4-FFF2-40B4-BE49-F238E27FC236}">
-                <a16:creationId xmlns:a16="http://schemas.microsoft.com/office/drawing/2014/main" id="{60FBE992-B63A-4C88-B8A4-BFA1087398DD}"/>
+                <a16:creationId xmlns:a16="http://schemas.microsoft.com/office/drawing/2014/main" id="{5052E9FB-DC39-423A-90AC-FE4A3A6F86F3}"/>
               </a:ext>
             </a:extLst>
           </p:cNvPr>
@@ -6168,7 +7619,7 @@
           <a:p>
             <a:r>
               <a:rPr lang="en-CA" dirty="0"/>
-              <a:t>Solution 1</a:t>
+              <a:t>Talk to your user</a:t>
             </a:r>
           </a:p>
         </p:txBody>
@@ -6178,7 +7629,7 @@
           <p:cNvPr id="3" name="Content Placeholder 2">
             <a:extLst>
               <a:ext uri="{FF2B5EF4-FFF2-40B4-BE49-F238E27FC236}">
-                <a16:creationId xmlns:a16="http://schemas.microsoft.com/office/drawing/2014/main" id="{F44E741A-FE57-4D53-865D-34CC64A6F4D1}"/>
+                <a16:creationId xmlns:a16="http://schemas.microsoft.com/office/drawing/2014/main" id="{0FEDF32F-3E49-424C-BB0E-E68353F38682}"/>
               </a:ext>
             </a:extLst>
           </p:cNvPr>
@@ -6194,47 +7645,14 @@
           <a:bodyPr/>
           <a:lstStyle/>
           <a:p>
-            <a:r>
-              <a:rPr lang="en-CA" dirty="0"/>
-              <a:t>Provide a legal resource for player-managers that will contain:</a:t>
-            </a:r>
-          </a:p>
-          <a:p>
-            <a:r>
-              <a:rPr lang="en-CA" dirty="0"/>
-              <a:t>-legal documentation</a:t>
-            </a:r>
-          </a:p>
-          <a:p>
-            <a:r>
-              <a:rPr lang="en-CA" dirty="0"/>
-              <a:t>-labor law documentation.</a:t>
-            </a:r>
-          </a:p>
-          <a:p>
-            <a:r>
-              <a:rPr lang="en-CA" dirty="0"/>
-              <a:t>-Attorney contact.</a:t>
-            </a:r>
-          </a:p>
-          <a:p>
-            <a:r>
-              <a:rPr lang="en-CA" dirty="0"/>
-              <a:t>-contract aide.</a:t>
-            </a:r>
-          </a:p>
-          <a:p>
-            <a:pPr marL="0" indent="0">
-              <a:buNone/>
-            </a:pPr>
-            <a:endParaRPr lang="en-CA" dirty="0"/>
+            <a:endParaRPr lang="en-CA"/>
           </a:p>
         </p:txBody>
       </p:sp>
     </p:spTree>
     <p:extLst>
       <p:ext uri="{BB962C8B-B14F-4D97-AF65-F5344CB8AC3E}">
-        <p14:creationId xmlns:p14="http://schemas.microsoft.com/office/powerpoint/2010/main" val="882208448"/>
+        <p14:creationId xmlns:p14="http://schemas.microsoft.com/office/powerpoint/2010/main" val="1934468901"/>
       </p:ext>
     </p:extLst>
   </p:cSld>

</xml_diff>